<commit_message>
cleanup & update presentation
</commit_message>
<xml_diff>
--- a/RoboSim/RoboSim.pptx
+++ b/RoboSim/RoboSim.pptx
@@ -5,10 +5,10 @@
     <p:sldMasterId id="2147483713" r:id="rId1"/>
   </p:sldMasterIdLst>
   <p:notesMasterIdLst>
-    <p:notesMasterId r:id="rId9"/>
+    <p:notesMasterId r:id="rId10"/>
   </p:notesMasterIdLst>
   <p:handoutMasterIdLst>
-    <p:handoutMasterId r:id="rId10"/>
+    <p:handoutMasterId r:id="rId11"/>
   </p:handoutMasterIdLst>
   <p:sldIdLst>
     <p:sldId id="256" r:id="rId2"/>
@@ -18,6 +18,7 @@
     <p:sldId id="259" r:id="rId6"/>
     <p:sldId id="261" r:id="rId7"/>
     <p:sldId id="262" r:id="rId8"/>
+    <p:sldId id="263" r:id="rId9"/>
   </p:sldIdLst>
   <p:sldSz cx="10693400" cy="7561263"/>
   <p:notesSz cx="6858000" cy="9144000"/>
@@ -4773,6 +4774,188 @@
       </p:par>
     </p:tnLst>
   </p:timing>
+</p:sld>
+</file>
+
+<file path=ppt/slides/slide8.xml><?xml version="1.0" encoding="utf-8"?>
+<p:sld xmlns:a="http://schemas.openxmlformats.org/drawingml/2006/main" xmlns:r="http://schemas.openxmlformats.org/officeDocument/2006/relationships" xmlns:p="http://schemas.openxmlformats.org/presentationml/2006/main">
+  <p:cSld>
+    <p:spTree>
+      <p:nvGrpSpPr>
+        <p:cNvPr id="1" name=""/>
+        <p:cNvGrpSpPr/>
+        <p:nvPr/>
+      </p:nvGrpSpPr>
+      <p:grpSpPr>
+        <a:xfrm>
+          <a:off x="0" y="0"/>
+          <a:ext cx="0" cy="0"/>
+          <a:chOff x="0" y="0"/>
+          <a:chExt cx="0" cy="0"/>
+        </a:xfrm>
+      </p:grpSpPr>
+      <p:sp>
+        <p:nvSpPr>
+          <p:cNvPr id="2" name="Datumsplatzhalter 1"/>
+          <p:cNvSpPr>
+            <a:spLocks noGrp="1"/>
+          </p:cNvSpPr>
+          <p:nvPr>
+            <p:ph type="dt" sz="half" idx="10"/>
+          </p:nvPr>
+        </p:nvSpPr>
+        <p:spPr/>
+        <p:txBody>
+          <a:bodyPr/>
+          <a:lstStyle/>
+          <a:p>
+            <a:fld id="{3F948DE9-8926-4906-9DE6-5AE508BE98CA}" type="datetime1">
+              <a:rPr lang="de-CH" smtClean="0">
+                <a:solidFill>
+                  <a:srgbClr val="000000"/>
+                </a:solidFill>
+              </a:rPr>
+              <a:t>13.01.2016</a:t>
+            </a:fld>
+            <a:endParaRPr lang="de-CH">
+              <a:solidFill>
+                <a:srgbClr val="000000"/>
+              </a:solidFill>
+            </a:endParaRPr>
+          </a:p>
+        </p:txBody>
+      </p:sp>
+      <p:sp>
+        <p:nvSpPr>
+          <p:cNvPr id="3" name="Fußzeilenplatzhalter 2"/>
+          <p:cNvSpPr>
+            <a:spLocks noGrp="1"/>
+          </p:cNvSpPr>
+          <p:nvPr>
+            <p:ph type="ftr" sz="quarter" idx="11"/>
+          </p:nvPr>
+        </p:nvSpPr>
+        <p:spPr/>
+        <p:txBody>
+          <a:bodyPr/>
+          <a:lstStyle/>
+          <a:p>
+            <a:r>
+              <a:rPr lang="de-CH" smtClean="0">
+                <a:solidFill>
+                  <a:srgbClr val="000000"/>
+                </a:solidFill>
+              </a:rPr>
+              <a:t>comgr</a:t>
+            </a:r>
+            <a:endParaRPr lang="de-CH" dirty="0">
+              <a:solidFill>
+                <a:srgbClr val="000000"/>
+              </a:solidFill>
+            </a:endParaRPr>
+          </a:p>
+        </p:txBody>
+      </p:sp>
+      <p:sp>
+        <p:nvSpPr>
+          <p:cNvPr id="4" name="Foliennummernplatzhalter 3"/>
+          <p:cNvSpPr>
+            <a:spLocks noGrp="1"/>
+          </p:cNvSpPr>
+          <p:nvPr>
+            <p:ph type="sldNum" sz="quarter" idx="12"/>
+          </p:nvPr>
+        </p:nvSpPr>
+        <p:spPr/>
+        <p:txBody>
+          <a:bodyPr/>
+          <a:lstStyle/>
+          <a:p>
+            <a:endParaRPr lang="de-CH" dirty="0">
+              <a:solidFill>
+                <a:srgbClr val="000000"/>
+              </a:solidFill>
+            </a:endParaRPr>
+          </a:p>
+        </p:txBody>
+      </p:sp>
+      <p:sp>
+        <p:nvSpPr>
+          <p:cNvPr id="5" name="Titel 4"/>
+          <p:cNvSpPr>
+            <a:spLocks noGrp="1"/>
+          </p:cNvSpPr>
+          <p:nvPr>
+            <p:ph type="title"/>
+          </p:nvPr>
+        </p:nvSpPr>
+        <p:spPr/>
+        <p:txBody>
+          <a:bodyPr/>
+          <a:lstStyle/>
+          <a:p>
+            <a:r>
+              <a:rPr lang="de-CH" dirty="0" smtClean="0"/>
+              <a:t>«Diverses»</a:t>
+            </a:r>
+            <a:endParaRPr lang="de-CH" dirty="0"/>
+          </a:p>
+        </p:txBody>
+      </p:sp>
+      <p:sp>
+        <p:nvSpPr>
+          <p:cNvPr id="6" name="Textplatzhalter 5"/>
+          <p:cNvSpPr>
+            <a:spLocks noGrp="1"/>
+          </p:cNvSpPr>
+          <p:nvPr>
+            <p:ph type="body" idx="1"/>
+          </p:nvPr>
+        </p:nvSpPr>
+        <p:spPr/>
+        <p:txBody>
+          <a:bodyPr/>
+          <a:lstStyle/>
+          <a:p>
+            <a:pPr marL="342900" indent="-342900">
+              <a:buFont typeface="Arial" panose="020B0604020202020204" pitchFamily="34" charset="0"/>
+              <a:buChar char="•"/>
+            </a:pPr>
+            <a:r>
+              <a:rPr lang="de-CH" dirty="0" smtClean="0"/>
+              <a:t>Raum</a:t>
+            </a:r>
+          </a:p>
+          <a:p>
+            <a:pPr marL="342900" indent="-342900">
+              <a:buFont typeface="Arial" panose="020B0604020202020204" pitchFamily="34" charset="0"/>
+              <a:buChar char="•"/>
+            </a:pPr>
+            <a:r>
+              <a:rPr lang="de-CH" dirty="0" smtClean="0"/>
+              <a:t>Objekte</a:t>
+            </a:r>
+            <a:r>
+              <a:rPr lang="de-CH" dirty="0"/>
+              <a:t> </a:t>
+            </a:r>
+            <a:r>
+              <a:rPr lang="de-CH" dirty="0" smtClean="0"/>
+              <a:t>&amp; Objektinteraktion</a:t>
+            </a:r>
+          </a:p>
+        </p:txBody>
+      </p:sp>
+    </p:spTree>
+    <p:extLst>
+      <p:ext uri="{BB962C8B-B14F-4D97-AF65-F5344CB8AC3E}">
+        <p14:creationId xmlns:p14="http://schemas.microsoft.com/office/powerpoint/2010/main" val="3077842626"/>
+      </p:ext>
+    </p:extLst>
+  </p:cSld>
+  <p:clrMapOvr>
+    <a:masterClrMapping/>
+  </p:clrMapOvr>
 </p:sld>
 </file>
 

</xml_diff>